<commit_message>
Introduction -> Motivation WIP
</commit_message>
<xml_diff>
--- a/slides/XTeam_RI_Vertical_iCubTelemetryVisualizer_05102021.pptx
+++ b/slides/XTeam_RI_Vertical_iCubTelemetryVisualizer_05102021.pptx
@@ -1628,6 +1628,172 @@
     <p:extLst>
       <p:ext uri="{BB962C8B-B14F-4D97-AF65-F5344CB8AC3E}">
         <p14:creationId xmlns:p14="http://schemas.microsoft.com/office/powerpoint/2010/main" val="4129670173"/>
+      </p:ext>
+    </p:extLst>
+  </p:cSld>
+  <p:clrMapOvr>
+    <a:masterClrMapping/>
+  </p:clrMapOvr>
+</p:notes>
+</file>
+
+<file path=ppt/notesSlides/notesSlide2.xml><?xml version="1.0" encoding="utf-8"?>
+<p:notes xmlns:a="http://schemas.openxmlformats.org/drawingml/2006/main" xmlns:r="http://schemas.openxmlformats.org/officeDocument/2006/relationships" xmlns:p="http://schemas.openxmlformats.org/presentationml/2006/main">
+  <p:cSld>
+    <p:spTree>
+      <p:nvGrpSpPr>
+        <p:cNvPr id="1" name=""/>
+        <p:cNvGrpSpPr/>
+        <p:nvPr/>
+      </p:nvGrpSpPr>
+      <p:grpSpPr>
+        <a:xfrm>
+          <a:off x="0" y="0"/>
+          <a:ext cx="0" cy="0"/>
+          <a:chOff x="0" y="0"/>
+          <a:chExt cx="0" cy="0"/>
+        </a:xfrm>
+      </p:grpSpPr>
+      <p:sp>
+        <p:nvSpPr>
+          <p:cNvPr id="2" name="Slide Image Placeholder 1"/>
+          <p:cNvSpPr>
+            <a:spLocks noGrp="1" noRot="1" noChangeAspect="1"/>
+          </p:cNvSpPr>
+          <p:nvPr>
+            <p:ph type="sldImg"/>
+          </p:nvPr>
+        </p:nvSpPr>
+        <p:spPr/>
+      </p:sp>
+      <p:sp>
+        <p:nvSpPr>
+          <p:cNvPr id="3" name="Notes Placeholder 2"/>
+          <p:cNvSpPr>
+            <a:spLocks noGrp="1"/>
+          </p:cNvSpPr>
+          <p:nvPr>
+            <p:ph type="body" idx="1"/>
+          </p:nvPr>
+        </p:nvSpPr>
+        <p:spPr/>
+        <p:txBody>
+          <a:bodyPr/>
+          <a:lstStyle/>
+          <a:p>
+            <a:r>
+              <a:rPr lang="en-IT" sz="1600" b="1" dirty="0"/>
+              <a:t>Yarpmanager tool</a:t>
+            </a:r>
+          </a:p>
+          <a:p>
+            <a:r>
+              <a:rPr lang="en-GB" dirty="0"/>
+              <a:t>The command-line utility "</a:t>
+            </a:r>
+            <a:r>
+              <a:rPr lang="en-GB" dirty="0" err="1"/>
+              <a:t>yarpmanager</a:t>
+            </a:r>
+            <a:r>
+              <a:rPr lang="en-GB" dirty="0"/>
+              <a:t>-console" and its graphical companions "</a:t>
+            </a:r>
+            <a:r>
+              <a:rPr lang="en-GB" dirty="0" err="1"/>
+              <a:t>yarpmanager</a:t>
+            </a:r>
+            <a:r>
+              <a:rPr lang="en-GB" dirty="0"/>
+              <a:t>" are tools for running and managing multiple programs on a set of machines.</a:t>
+            </a:r>
+            <a:endParaRPr lang="en-IT" dirty="0"/>
+          </a:p>
+          <a:p>
+            <a:pPr marL="171450" indent="-171450">
+              <a:buFontTx/>
+              <a:buChar char="-"/>
+            </a:pPr>
+            <a:r>
+              <a:rPr lang="en-GB" dirty="0"/>
+              <a:t>C</a:t>
+            </a:r>
+            <a:r>
+              <a:rPr lang="en-IT" dirty="0"/>
+              <a:t>reate apps from third-party apps, yarp modules and/or devices (yarpdev &lt;device&gt;)</a:t>
+            </a:r>
+          </a:p>
+          <a:p>
+            <a:pPr marL="171450" indent="-171450">
+              <a:buFontTx/>
+              <a:buChar char="-"/>
+            </a:pPr>
+            <a:r>
+              <a:rPr lang="en-GB" dirty="0"/>
+              <a:t>D</a:t>
+            </a:r>
+            <a:r>
+              <a:rPr lang="en-IT" dirty="0"/>
+              <a:t>efine app resources</a:t>
+            </a:r>
+          </a:p>
+          <a:p>
+            <a:pPr marL="171450" indent="-171450">
+              <a:buFontTx/>
+              <a:buChar char="-"/>
+            </a:pPr>
+            <a:r>
+              <a:rPr lang="en-GB" dirty="0"/>
+              <a:t>C</a:t>
+            </a:r>
+            <a:r>
+              <a:rPr lang="en-IT" dirty="0"/>
+              <a:t>onnect/disconnect ports</a:t>
+            </a:r>
+          </a:p>
+          <a:p>
+            <a:pPr marL="171450" indent="-171450">
+              <a:buFontTx/>
+              <a:buChar char="-"/>
+            </a:pPr>
+            <a:endParaRPr lang="en-IT" dirty="0"/>
+          </a:p>
+          <a:p>
+            <a:pPr marL="171450" indent="-171450">
+              <a:buFontTx/>
+              <a:buChar char="-"/>
+            </a:pPr>
+            <a:endParaRPr lang="en-GB" dirty="0"/>
+          </a:p>
+        </p:txBody>
+      </p:sp>
+      <p:sp>
+        <p:nvSpPr>
+          <p:cNvPr id="4" name="Slide Number Placeholder 3"/>
+          <p:cNvSpPr>
+            <a:spLocks noGrp="1"/>
+          </p:cNvSpPr>
+          <p:nvPr>
+            <p:ph type="sldNum" sz="quarter" idx="5"/>
+          </p:nvPr>
+        </p:nvSpPr>
+        <p:spPr/>
+        <p:txBody>
+          <a:bodyPr/>
+          <a:lstStyle/>
+          <a:p>
+            <a:fld id="{C11B23DB-FBD8-1C48-856C-19FB6ACB7C91}" type="slidenum">
+              <a:rPr lang="en-IT" smtClean="0"/>
+              <a:t>2</a:t>
+            </a:fld>
+            <a:endParaRPr lang="en-IT"/>
+          </a:p>
+        </p:txBody>
+      </p:sp>
+    </p:spTree>
+    <p:extLst>
+      <p:ext uri="{BB962C8B-B14F-4D97-AF65-F5344CB8AC3E}">
+        <p14:creationId xmlns:p14="http://schemas.microsoft.com/office/powerpoint/2010/main" val="3405869987"/>
       </p:ext>
     </p:extLst>
   </p:cSld>
@@ -5840,7 +6006,7 @@
           <a:lstStyle/>
           <a:p>
             <a:r>
-              <a:rPr lang="en-GB" dirty="0"/>
+              <a:rPr lang="en-GB" sz="2600" dirty="0"/>
               <a:t>Running an experiment…</a:t>
             </a:r>
           </a:p>
@@ -5850,7 +6016,7 @@
               <a:buChar char="§"/>
             </a:pPr>
             <a:r>
-              <a:rPr lang="en-GB" dirty="0"/>
+              <a:rPr lang="en-GB" sz="2200" dirty="0"/>
               <a:t>Hard time constraints</a:t>
             </a:r>
           </a:p>
@@ -5860,7 +6026,7 @@
               <a:buChar char="§"/>
             </a:pPr>
             <a:r>
-              <a:rPr lang="en-GB" dirty="0"/>
+              <a:rPr lang="en-GB" sz="2200" dirty="0"/>
               <a:t>Setup complexity</a:t>
             </a:r>
           </a:p>
@@ -5870,7 +6036,7 @@
               <a:buChar char="§"/>
             </a:pPr>
             <a:r>
-              <a:rPr lang="en-GB" dirty="0"/>
+              <a:rPr lang="en-GB" sz="2200" dirty="0"/>
               <a:t>Stress</a:t>
             </a:r>
           </a:p>
@@ -6003,7 +6169,7 @@
         </p:nvSpPr>
         <p:spPr>
           <a:xfrm>
-            <a:off x="1550960" y="3625304"/>
+            <a:off x="1550960" y="4028987"/>
             <a:ext cx="1777040" cy="448574"/>
           </a:xfrm>
           <a:prstGeom prst="roundRect">
@@ -6058,7 +6224,7 @@
         </p:nvSpPr>
         <p:spPr>
           <a:xfrm>
-            <a:off x="1550959" y="4144551"/>
+            <a:off x="1550959" y="4548234"/>
             <a:ext cx="1777041" cy="448574"/>
           </a:xfrm>
           <a:prstGeom prst="roundRect">
@@ -6110,8 +6276,8 @@
         </p:nvSpPr>
         <p:spPr>
           <a:xfrm>
-            <a:off x="6011536" y="4867851"/>
-            <a:ext cx="1905719" cy="1030063"/>
+            <a:off x="8610600" y="3122613"/>
+            <a:ext cx="2521066" cy="1030063"/>
           </a:xfrm>
           <a:prstGeom prst="cloud">
             <a:avLst/>
@@ -6139,13 +6305,10 @@
           <a:p>
             <a:pPr algn="ctr"/>
             <a:r>
-              <a:rPr lang="en-GB" dirty="0"/>
-              <a:t>S</a:t>
-            </a:r>
-            <a:r>
-              <a:rPr lang="en-IT" dirty="0"/>
-              <a:t>tarting the server</a:t>
-            </a:r>
+              <a:rPr lang="en-US" dirty="0"/>
+              <a:t>Run individual plotters</a:t>
+            </a:r>
+            <a:endParaRPr lang="en-IT" dirty="0"/>
           </a:p>
         </p:txBody>
       </p:sp>
@@ -6163,7 +6326,7 @@
         </p:nvSpPr>
         <p:spPr>
           <a:xfrm>
-            <a:off x="1550959" y="4679838"/>
+            <a:off x="1550959" y="5083521"/>
             <a:ext cx="1777041" cy="448574"/>
           </a:xfrm>
           <a:prstGeom prst="roundRect">
@@ -6215,8 +6378,8 @@
         </p:nvSpPr>
         <p:spPr>
           <a:xfrm>
-            <a:off x="1550959" y="5232467"/>
-            <a:ext cx="1777041" cy="540813"/>
+            <a:off x="1550959" y="5636151"/>
+            <a:ext cx="1777041" cy="448574"/>
           </a:xfrm>
           <a:prstGeom prst="roundRect">
             <a:avLst>
@@ -6246,8 +6409,12 @@
           <a:p>
             <a:pPr algn="ctr"/>
             <a:r>
+              <a:rPr lang="en-US" dirty="0" err="1"/>
+              <a:t>RobotViz</a:t>
+            </a:r>
+            <a:r>
               <a:rPr lang="en-US" dirty="0"/>
-              <a:t>Robot visualization</a:t>
+              <a:t>.</a:t>
             </a:r>
             <a:endParaRPr lang="en-IT" dirty="0"/>
           </a:p>
@@ -6267,7 +6434,7 @@
         </p:nvSpPr>
         <p:spPr>
           <a:xfrm>
-            <a:off x="5789403" y="2522096"/>
+            <a:off x="8610601" y="1866129"/>
             <a:ext cx="2286000" cy="1030063"/>
           </a:xfrm>
           <a:prstGeom prst="cloud">
@@ -6317,8 +6484,8 @@
         </p:nvSpPr>
         <p:spPr>
           <a:xfrm>
-            <a:off x="5789403" y="3731546"/>
-            <a:ext cx="2286000" cy="1030063"/>
+            <a:off x="8610600" y="286424"/>
+            <a:ext cx="3098533" cy="1404341"/>
           </a:xfrm>
           <a:prstGeom prst="cloud">
             <a:avLst/>
@@ -6344,22 +6511,26 @@
           <a:bodyPr rtlCol="0" anchor="ctr"/>
           <a:lstStyle/>
           <a:p>
-            <a:pPr algn="ctr"/>
             <a:r>
               <a:rPr lang="en-US" dirty="0"/>
-              <a:t>Apps: </a:t>
+              <a:t>Start YARP server</a:t>
+            </a:r>
+          </a:p>
+          <a:p>
+            <a:r>
+              <a:rPr lang="en-US" dirty="0"/>
+              <a:t>Run </a:t>
             </a:r>
             <a:r>
               <a:rPr lang="en-US" dirty="0" err="1"/>
-              <a:t>yarpview</a:t>
-            </a:r>
+              <a:t>Yarpmanager</a:t>
+            </a:r>
+            <a:endParaRPr lang="en-US" dirty="0"/>
+          </a:p>
+          <a:p>
             <a:r>
               <a:rPr lang="en-US" dirty="0"/>
-              <a:t>, </a:t>
-            </a:r>
-            <a:r>
-              <a:rPr lang="en-US" dirty="0" err="1"/>
-              <a:t>iCubGUI</a:t>
+              <a:t>Load app config</a:t>
             </a:r>
             <a:endParaRPr lang="en-IT" dirty="0"/>
           </a:p>
@@ -6379,8 +6550,8 @@
         </p:nvSpPr>
         <p:spPr>
           <a:xfrm>
-            <a:off x="3890514" y="2982367"/>
-            <a:ext cx="1777040" cy="1136305"/>
+            <a:off x="6121029" y="4520765"/>
+            <a:ext cx="1777040" cy="912300"/>
           </a:xfrm>
           <a:prstGeom prst="rect">
             <a:avLst/>
@@ -6413,10 +6584,6 @@
             </a:r>
             <a:endParaRPr lang="en-IT" dirty="0"/>
           </a:p>
-          <a:p>
-            <a:pPr algn="ctr"/>
-            <a:endParaRPr lang="en-IT" dirty="0"/>
-          </a:p>
         </p:txBody>
       </p:sp>
       <p:sp>
@@ -6433,8 +6600,8 @@
         </p:nvSpPr>
         <p:spPr>
           <a:xfrm>
-            <a:off x="3890514" y="4193456"/>
-            <a:ext cx="1777040" cy="846580"/>
+            <a:off x="6121029" y="2599454"/>
+            <a:ext cx="1777040" cy="1166746"/>
           </a:xfrm>
           <a:prstGeom prst="rect">
             <a:avLst/>
@@ -6463,7 +6630,7 @@
             <a:pPr algn="ctr"/>
             <a:r>
               <a:rPr lang="en-US" dirty="0"/>
-              <a:t>Multiple apps: </a:t>
+              <a:t>Running apps: </a:t>
             </a:r>
             <a:r>
               <a:rPr lang="en-US" dirty="0" err="1"/>
@@ -6477,7 +6644,686 @@
               <a:rPr lang="en-US" dirty="0" err="1"/>
               <a:t>iCubGUI</a:t>
             </a:r>
+            <a:r>
+              <a:rPr lang="en-US" dirty="0"/>
+              <a:t>, </a:t>
+            </a:r>
+            <a:r>
+              <a:rPr lang="en-US" dirty="0" err="1"/>
+              <a:t>WalkingModule</a:t>
+            </a:r>
             <a:endParaRPr lang="en-IT" dirty="0"/>
+          </a:p>
+        </p:txBody>
+      </p:sp>
+      <p:sp>
+        <p:nvSpPr>
+          <p:cNvPr id="2" name="TextBox 1">
+            <a:extLst>
+              <a:ext uri="{FF2B5EF4-FFF2-40B4-BE49-F238E27FC236}">
+                <a16:creationId xmlns:a16="http://schemas.microsoft.com/office/drawing/2014/main" id="{025133B8-2B21-FD48-8D53-8B7818EBB67A}"/>
+              </a:ext>
+            </a:extLst>
+          </p:cNvPr>
+          <p:cNvSpPr txBox="1"/>
+          <p:nvPr/>
+        </p:nvSpPr>
+        <p:spPr>
+          <a:xfrm>
+            <a:off x="1566333" y="3429000"/>
+            <a:ext cx="1735667" cy="381000"/>
+          </a:xfrm>
+          <a:prstGeom prst="rect">
+            <a:avLst/>
+          </a:prstGeom>
+          <a:noFill/>
+          <a:ln>
+            <a:solidFill>
+              <a:schemeClr val="accent1"/>
+            </a:solidFill>
+          </a:ln>
+        </p:spPr>
+        <p:txBody>
+          <a:bodyPr wrap="square" rtlCol="0">
+            <a:spAutoFit/>
+          </a:bodyPr>
+          <a:lstStyle/>
+          <a:p>
+            <a:pPr algn="ctr"/>
+            <a:r>
+              <a:rPr lang="en-IT" dirty="0"/>
+              <a:t>Monitoring</a:t>
+            </a:r>
+          </a:p>
+        </p:txBody>
+      </p:sp>
+      <p:sp>
+        <p:nvSpPr>
+          <p:cNvPr id="17" name="TextBox 16">
+            <a:extLst>
+              <a:ext uri="{FF2B5EF4-FFF2-40B4-BE49-F238E27FC236}">
+                <a16:creationId xmlns:a16="http://schemas.microsoft.com/office/drawing/2014/main" id="{A509DE6D-7A7B-9F49-9436-073F3322C419}"/>
+              </a:ext>
+            </a:extLst>
+          </p:cNvPr>
+          <p:cNvSpPr txBox="1"/>
+          <p:nvPr/>
+        </p:nvSpPr>
+        <p:spPr>
+          <a:xfrm>
+            <a:off x="3590086" y="3429000"/>
+            <a:ext cx="1735667" cy="381000"/>
+          </a:xfrm>
+          <a:prstGeom prst="rect">
+            <a:avLst/>
+          </a:prstGeom>
+          <a:noFill/>
+          <a:ln>
+            <a:solidFill>
+              <a:schemeClr val="accent1"/>
+            </a:solidFill>
+          </a:ln>
+        </p:spPr>
+        <p:txBody>
+          <a:bodyPr wrap="square" rtlCol="0">
+            <a:spAutoFit/>
+          </a:bodyPr>
+          <a:lstStyle/>
+          <a:p>
+            <a:pPr algn="ctr"/>
+            <a:r>
+              <a:rPr lang="en-IT" dirty="0"/>
+              <a:t>Control Inputs</a:t>
+            </a:r>
+          </a:p>
+        </p:txBody>
+      </p:sp>
+      <p:sp>
+        <p:nvSpPr>
+          <p:cNvPr id="21" name="Rounded Rectangle 20">
+            <a:extLst>
+              <a:ext uri="{FF2B5EF4-FFF2-40B4-BE49-F238E27FC236}">
+                <a16:creationId xmlns:a16="http://schemas.microsoft.com/office/drawing/2014/main" id="{A95397BC-DB06-3E4A-A9E9-788F7BAE6029}"/>
+              </a:ext>
+            </a:extLst>
+          </p:cNvPr>
+          <p:cNvSpPr/>
+          <p:nvPr/>
+        </p:nvSpPr>
+        <p:spPr>
+          <a:xfrm>
+            <a:off x="3590086" y="4028987"/>
+            <a:ext cx="1777040" cy="448574"/>
+          </a:xfrm>
+          <a:prstGeom prst="roundRect">
+            <a:avLst>
+              <a:gd name="adj" fmla="val 49359"/>
+            </a:avLst>
+          </a:prstGeom>
+        </p:spPr>
+        <p:style>
+          <a:lnRef idx="2">
+            <a:schemeClr val="accent1">
+              <a:shade val="50000"/>
+            </a:schemeClr>
+          </a:lnRef>
+          <a:fillRef idx="1">
+            <a:schemeClr val="accent1"/>
+          </a:fillRef>
+          <a:effectRef idx="0">
+            <a:schemeClr val="accent1"/>
+          </a:effectRef>
+          <a:fontRef idx="minor">
+            <a:schemeClr val="lt1"/>
+          </a:fontRef>
+        </p:style>
+        <p:txBody>
+          <a:bodyPr rtlCol="0" anchor="ctr"/>
+          <a:lstStyle/>
+          <a:p>
+            <a:pPr algn="ctr"/>
+            <a:r>
+              <a:rPr lang="en-US" dirty="0"/>
+              <a:t>Walking Coord.</a:t>
+            </a:r>
+            <a:endParaRPr lang="en-IT" dirty="0"/>
+          </a:p>
+        </p:txBody>
+      </p:sp>
+      <p:sp>
+        <p:nvSpPr>
+          <p:cNvPr id="22" name="Rounded Rectangle 21">
+            <a:extLst>
+              <a:ext uri="{FF2B5EF4-FFF2-40B4-BE49-F238E27FC236}">
+                <a16:creationId xmlns:a16="http://schemas.microsoft.com/office/drawing/2014/main" id="{68654EFF-B235-4E48-8D04-4E40F01DC219}"/>
+              </a:ext>
+            </a:extLst>
+          </p:cNvPr>
+          <p:cNvSpPr/>
+          <p:nvPr/>
+        </p:nvSpPr>
+        <p:spPr>
+          <a:xfrm>
+            <a:off x="3590085" y="4548234"/>
+            <a:ext cx="1777041" cy="448574"/>
+          </a:xfrm>
+          <a:prstGeom prst="roundRect">
+            <a:avLst>
+              <a:gd name="adj" fmla="val 49359"/>
+            </a:avLst>
+          </a:prstGeom>
+        </p:spPr>
+        <p:style>
+          <a:lnRef idx="2">
+            <a:schemeClr val="accent1">
+              <a:shade val="50000"/>
+            </a:schemeClr>
+          </a:lnRef>
+          <a:fillRef idx="1">
+            <a:schemeClr val="accent1"/>
+          </a:fillRef>
+          <a:effectRef idx="0">
+            <a:schemeClr val="accent1"/>
+          </a:effectRef>
+          <a:fontRef idx="minor">
+            <a:schemeClr val="lt1"/>
+          </a:fontRef>
+        </p:style>
+        <p:txBody>
+          <a:bodyPr rtlCol="0" anchor="ctr"/>
+          <a:lstStyle/>
+          <a:p>
+            <a:pPr algn="ctr"/>
+            <a:r>
+              <a:rPr lang="en-US" dirty="0" err="1"/>
+              <a:t>Virtualizer</a:t>
+            </a:r>
+            <a:endParaRPr lang="en-IT" dirty="0"/>
+          </a:p>
+        </p:txBody>
+      </p:sp>
+      <p:sp>
+        <p:nvSpPr>
+          <p:cNvPr id="23" name="Rounded Rectangle 22">
+            <a:extLst>
+              <a:ext uri="{FF2B5EF4-FFF2-40B4-BE49-F238E27FC236}">
+                <a16:creationId xmlns:a16="http://schemas.microsoft.com/office/drawing/2014/main" id="{A3D2488F-FAE3-774C-93C9-D9CAF29E1784}"/>
+              </a:ext>
+            </a:extLst>
+          </p:cNvPr>
+          <p:cNvSpPr/>
+          <p:nvPr/>
+        </p:nvSpPr>
+        <p:spPr>
+          <a:xfrm>
+            <a:off x="3590085" y="5083521"/>
+            <a:ext cx="1777041" cy="448574"/>
+          </a:xfrm>
+          <a:prstGeom prst="roundRect">
+            <a:avLst>
+              <a:gd name="adj" fmla="val 49359"/>
+            </a:avLst>
+          </a:prstGeom>
+        </p:spPr>
+        <p:style>
+          <a:lnRef idx="2">
+            <a:schemeClr val="accent1">
+              <a:shade val="50000"/>
+            </a:schemeClr>
+          </a:lnRef>
+          <a:fillRef idx="1">
+            <a:schemeClr val="accent1"/>
+          </a:fillRef>
+          <a:effectRef idx="0">
+            <a:schemeClr val="accent1"/>
+          </a:effectRef>
+          <a:fontRef idx="minor">
+            <a:schemeClr val="lt1"/>
+          </a:fontRef>
+        </p:style>
+        <p:txBody>
+          <a:bodyPr rtlCol="0" anchor="ctr"/>
+          <a:lstStyle/>
+          <a:p>
+            <a:pPr algn="ctr"/>
+            <a:r>
+              <a:rPr lang="en-US" dirty="0"/>
+              <a:t>VR + gloves</a:t>
+            </a:r>
+            <a:endParaRPr lang="en-IT" dirty="0"/>
+          </a:p>
+        </p:txBody>
+      </p:sp>
+      <p:sp>
+        <p:nvSpPr>
+          <p:cNvPr id="24" name="Rounded Rectangle 23">
+            <a:extLst>
+              <a:ext uri="{FF2B5EF4-FFF2-40B4-BE49-F238E27FC236}">
+                <a16:creationId xmlns:a16="http://schemas.microsoft.com/office/drawing/2014/main" id="{A6582D35-C4FE-F542-ACE0-CFBC1E9B13F4}"/>
+              </a:ext>
+            </a:extLst>
+          </p:cNvPr>
+          <p:cNvSpPr/>
+          <p:nvPr/>
+        </p:nvSpPr>
+        <p:spPr>
+          <a:xfrm>
+            <a:off x="3590085" y="5636151"/>
+            <a:ext cx="1777041" cy="448574"/>
+          </a:xfrm>
+          <a:prstGeom prst="roundRect">
+            <a:avLst>
+              <a:gd name="adj" fmla="val 49359"/>
+            </a:avLst>
+          </a:prstGeom>
+        </p:spPr>
+        <p:style>
+          <a:lnRef idx="2">
+            <a:schemeClr val="accent1">
+              <a:shade val="50000"/>
+            </a:schemeClr>
+          </a:lnRef>
+          <a:fillRef idx="1">
+            <a:schemeClr val="accent1"/>
+          </a:fillRef>
+          <a:effectRef idx="0">
+            <a:schemeClr val="accent1"/>
+          </a:effectRef>
+          <a:fontRef idx="minor">
+            <a:schemeClr val="lt1"/>
+          </a:fontRef>
+        </p:style>
+        <p:txBody>
+          <a:bodyPr rtlCol="0" anchor="ctr"/>
+          <a:lstStyle/>
+          <a:p>
+            <a:pPr algn="ctr"/>
+            <a:r>
+              <a:rPr lang="en-US" dirty="0" err="1"/>
+              <a:t>Sensorised</a:t>
+            </a:r>
+            <a:r>
+              <a:rPr lang="en-US" dirty="0"/>
+              <a:t> suit</a:t>
+            </a:r>
+            <a:endParaRPr lang="en-IT" dirty="0"/>
+          </a:p>
+        </p:txBody>
+      </p:sp>
+      <p:sp>
+        <p:nvSpPr>
+          <p:cNvPr id="25" name="Rectangle 24">
+            <a:extLst>
+              <a:ext uri="{FF2B5EF4-FFF2-40B4-BE49-F238E27FC236}">
+                <a16:creationId xmlns:a16="http://schemas.microsoft.com/office/drawing/2014/main" id="{7C3ED6FE-A6B0-9641-B417-4C92FA8F11A1}"/>
+              </a:ext>
+            </a:extLst>
+          </p:cNvPr>
+          <p:cNvSpPr/>
+          <p:nvPr/>
+        </p:nvSpPr>
+        <p:spPr>
+          <a:xfrm>
+            <a:off x="6121029" y="3853539"/>
+            <a:ext cx="1777040" cy="478523"/>
+          </a:xfrm>
+          <a:prstGeom prst="rect">
+            <a:avLst/>
+          </a:prstGeom>
+        </p:spPr>
+        <p:style>
+          <a:lnRef idx="2">
+            <a:schemeClr val="accent1">
+              <a:shade val="50000"/>
+            </a:schemeClr>
+          </a:lnRef>
+          <a:fillRef idx="1">
+            <a:schemeClr val="accent1"/>
+          </a:fillRef>
+          <a:effectRef idx="0">
+            <a:schemeClr val="accent1"/>
+          </a:effectRef>
+          <a:fontRef idx="minor">
+            <a:schemeClr val="lt1"/>
+          </a:fontRef>
+        </p:style>
+        <p:txBody>
+          <a:bodyPr rtlCol="0" anchor="ctr"/>
+          <a:lstStyle/>
+          <a:p>
+            <a:pPr algn="ctr"/>
+            <a:r>
+              <a:rPr lang="en-US" dirty="0"/>
+              <a:t>Connecting ports</a:t>
+            </a:r>
+            <a:endParaRPr lang="en-IT" dirty="0"/>
+          </a:p>
+        </p:txBody>
+      </p:sp>
+      <p:sp>
+        <p:nvSpPr>
+          <p:cNvPr id="26" name="Rectangle 25">
+            <a:extLst>
+              <a:ext uri="{FF2B5EF4-FFF2-40B4-BE49-F238E27FC236}">
+                <a16:creationId xmlns:a16="http://schemas.microsoft.com/office/drawing/2014/main" id="{2E7D44E4-E956-7E4F-B5DF-38E7DF172837}"/>
+              </a:ext>
+            </a:extLst>
+          </p:cNvPr>
+          <p:cNvSpPr/>
+          <p:nvPr/>
+        </p:nvSpPr>
+        <p:spPr>
+          <a:xfrm>
+            <a:off x="6121029" y="5500356"/>
+            <a:ext cx="1777040" cy="584369"/>
+          </a:xfrm>
+          <a:prstGeom prst="rect">
+            <a:avLst/>
+          </a:prstGeom>
+        </p:spPr>
+        <p:style>
+          <a:lnRef idx="2">
+            <a:schemeClr val="accent1">
+              <a:shade val="50000"/>
+            </a:schemeClr>
+          </a:lnRef>
+          <a:fillRef idx="1">
+            <a:schemeClr val="accent1"/>
+          </a:fillRef>
+          <a:effectRef idx="0">
+            <a:schemeClr val="accent1"/>
+          </a:effectRef>
+          <a:fontRef idx="minor">
+            <a:schemeClr val="lt1"/>
+          </a:fontRef>
+        </p:style>
+        <p:txBody>
+          <a:bodyPr rtlCol="0" anchor="ctr"/>
+          <a:lstStyle/>
+          <a:p>
+            <a:pPr algn="ctr"/>
+            <a:r>
+              <a:rPr lang="en-US" dirty="0"/>
+              <a:t>RPC client on terminal</a:t>
+            </a:r>
+            <a:endParaRPr lang="en-IT" dirty="0"/>
+          </a:p>
+        </p:txBody>
+      </p:sp>
+      <p:sp>
+        <p:nvSpPr>
+          <p:cNvPr id="27" name="Cloud 26">
+            <a:extLst>
+              <a:ext uri="{FF2B5EF4-FFF2-40B4-BE49-F238E27FC236}">
+                <a16:creationId xmlns:a16="http://schemas.microsoft.com/office/drawing/2014/main" id="{5C18E897-5FE9-D448-A554-5F0898F4AA4C}"/>
+              </a:ext>
+            </a:extLst>
+          </p:cNvPr>
+          <p:cNvSpPr/>
+          <p:nvPr/>
+        </p:nvSpPr>
+        <p:spPr>
+          <a:xfrm>
+            <a:off x="8610600" y="4332063"/>
+            <a:ext cx="2521066" cy="1030063"/>
+          </a:xfrm>
+          <a:prstGeom prst="cloud">
+            <a:avLst/>
+          </a:prstGeom>
+        </p:spPr>
+        <p:style>
+          <a:lnRef idx="2">
+            <a:schemeClr val="accent1">
+              <a:shade val="50000"/>
+            </a:schemeClr>
+          </a:lnRef>
+          <a:fillRef idx="1">
+            <a:schemeClr val="accent1"/>
+          </a:fillRef>
+          <a:effectRef idx="0">
+            <a:schemeClr val="accent1"/>
+          </a:effectRef>
+          <a:fontRef idx="minor">
+            <a:schemeClr val="lt1"/>
+          </a:fontRef>
+        </p:style>
+        <p:txBody>
+          <a:bodyPr rtlCol="0" anchor="ctr"/>
+          <a:lstStyle/>
+          <a:p>
+            <a:pPr algn="ctr"/>
+            <a:r>
+              <a:rPr lang="en-US" dirty="0"/>
+              <a:t>Type RPC commands</a:t>
+            </a:r>
+            <a:endParaRPr lang="en-IT" dirty="0"/>
+          </a:p>
+        </p:txBody>
+      </p:sp>
+      <p:sp>
+        <p:nvSpPr>
+          <p:cNvPr id="28" name="Cloud 27">
+            <a:extLst>
+              <a:ext uri="{FF2B5EF4-FFF2-40B4-BE49-F238E27FC236}">
+                <a16:creationId xmlns:a16="http://schemas.microsoft.com/office/drawing/2014/main" id="{4D374B71-D4B6-AB41-B5D8-4DB593833A40}"/>
+              </a:ext>
+            </a:extLst>
+          </p:cNvPr>
+          <p:cNvSpPr/>
+          <p:nvPr/>
+        </p:nvSpPr>
+        <p:spPr>
+          <a:xfrm>
+            <a:off x="8610600" y="5541513"/>
+            <a:ext cx="2521066" cy="1030063"/>
+          </a:xfrm>
+          <a:prstGeom prst="cloud">
+            <a:avLst/>
+          </a:prstGeom>
+        </p:spPr>
+        <p:style>
+          <a:lnRef idx="2">
+            <a:schemeClr val="accent1">
+              <a:shade val="50000"/>
+            </a:schemeClr>
+          </a:lnRef>
+          <a:fillRef idx="1">
+            <a:schemeClr val="accent1"/>
+          </a:fillRef>
+          <a:effectRef idx="0">
+            <a:schemeClr val="accent1"/>
+          </a:effectRef>
+          <a:fontRef idx="minor">
+            <a:schemeClr val="lt1"/>
+          </a:fontRef>
+        </p:style>
+        <p:txBody>
+          <a:bodyPr rtlCol="0" anchor="ctr"/>
+          <a:lstStyle/>
+          <a:p>
+            <a:pPr algn="ctr"/>
+            <a:r>
+              <a:rPr lang="en-US" dirty="0"/>
+              <a:t>Organize workspace</a:t>
+            </a:r>
+            <a:endParaRPr lang="en-IT" dirty="0"/>
+          </a:p>
+        </p:txBody>
+      </p:sp>
+      <p:sp>
+        <p:nvSpPr>
+          <p:cNvPr id="3" name="Rectangle 2">
+            <a:extLst>
+              <a:ext uri="{FF2B5EF4-FFF2-40B4-BE49-F238E27FC236}">
+                <a16:creationId xmlns:a16="http://schemas.microsoft.com/office/drawing/2014/main" id="{F70F8638-3378-BB4F-80F6-A0BA66FB30CE}"/>
+              </a:ext>
+            </a:extLst>
+          </p:cNvPr>
+          <p:cNvSpPr/>
+          <p:nvPr/>
+        </p:nvSpPr>
+        <p:spPr>
+          <a:xfrm>
+            <a:off x="6067125" y="2521818"/>
+            <a:ext cx="1892968" cy="1906709"/>
+          </a:xfrm>
+          <a:prstGeom prst="rect">
+            <a:avLst/>
+          </a:prstGeom>
+          <a:noFill/>
+          <a:ln w="28575">
+            <a:solidFill>
+              <a:srgbClr val="FF0000"/>
+            </a:solidFill>
+          </a:ln>
+        </p:spPr>
+        <p:style>
+          <a:lnRef idx="2">
+            <a:schemeClr val="accent1">
+              <a:shade val="50000"/>
+            </a:schemeClr>
+          </a:lnRef>
+          <a:fillRef idx="1">
+            <a:schemeClr val="accent1"/>
+          </a:fillRef>
+          <a:effectRef idx="0">
+            <a:schemeClr val="accent1"/>
+          </a:effectRef>
+          <a:fontRef idx="minor">
+            <a:schemeClr val="lt1"/>
+          </a:fontRef>
+        </p:style>
+        <p:txBody>
+          <a:bodyPr rtlCol="0" anchor="ctr"/>
+          <a:lstStyle/>
+          <a:p>
+            <a:pPr algn="ctr"/>
+            <a:endParaRPr lang="en-IT"/>
+          </a:p>
+        </p:txBody>
+      </p:sp>
+      <p:cxnSp>
+        <p:nvCxnSpPr>
+          <p:cNvPr id="5" name="Straight Arrow Connector 4">
+            <a:extLst>
+              <a:ext uri="{FF2B5EF4-FFF2-40B4-BE49-F238E27FC236}">
+                <a16:creationId xmlns:a16="http://schemas.microsoft.com/office/drawing/2014/main" id="{62409E8D-5929-5444-966B-9A8E3506A9DC}"/>
+              </a:ext>
+            </a:extLst>
+          </p:cNvPr>
+          <p:cNvCxnSpPr>
+            <a:cxnSpLocks/>
+            <a:stCxn id="3" idx="0"/>
+            <a:endCxn id="39" idx="2"/>
+          </p:cNvCxnSpPr>
+          <p:nvPr/>
+        </p:nvCxnSpPr>
+        <p:spPr>
+          <a:xfrm rot="5400000" flipH="1" flipV="1">
+            <a:off x="7050299" y="951906"/>
+            <a:ext cx="1533223" cy="1606602"/>
+          </a:xfrm>
+          <a:prstGeom prst="curvedConnector2">
+            <a:avLst/>
+          </a:prstGeom>
+          <a:ln w="34925" cmpd="dbl">
+            <a:tailEnd type="triangle"/>
+          </a:ln>
+        </p:spPr>
+        <p:style>
+          <a:lnRef idx="1">
+            <a:schemeClr val="accent1"/>
+          </a:lnRef>
+          <a:fillRef idx="0">
+            <a:schemeClr val="accent1"/>
+          </a:fillRef>
+          <a:effectRef idx="0">
+            <a:schemeClr val="accent1"/>
+          </a:effectRef>
+          <a:fontRef idx="minor">
+            <a:schemeClr val="tx1"/>
+          </a:fontRef>
+        </p:style>
+      </p:cxnSp>
+      <p:sp>
+        <p:nvSpPr>
+          <p:cNvPr id="6" name="Right Bracket 5">
+            <a:extLst>
+              <a:ext uri="{FF2B5EF4-FFF2-40B4-BE49-F238E27FC236}">
+                <a16:creationId xmlns:a16="http://schemas.microsoft.com/office/drawing/2014/main" id="{19809A92-FE32-254C-A62D-C960A1AC5CBF}"/>
+              </a:ext>
+            </a:extLst>
+          </p:cNvPr>
+          <p:cNvSpPr/>
+          <p:nvPr/>
+        </p:nvSpPr>
+        <p:spPr>
+          <a:xfrm>
+            <a:off x="11353800" y="1780674"/>
+            <a:ext cx="81013" cy="4575676"/>
+          </a:xfrm>
+          <a:prstGeom prst="rightBracket">
+            <a:avLst/>
+          </a:prstGeom>
+        </p:spPr>
+        <p:style>
+          <a:lnRef idx="1">
+            <a:schemeClr val="accent1"/>
+          </a:lnRef>
+          <a:fillRef idx="0">
+            <a:schemeClr val="accent1"/>
+          </a:fillRef>
+          <a:effectRef idx="0">
+            <a:schemeClr val="accent1"/>
+          </a:effectRef>
+          <a:fontRef idx="minor">
+            <a:schemeClr val="tx1"/>
+          </a:fontRef>
+        </p:style>
+        <p:txBody>
+          <a:bodyPr rtlCol="0" anchor="ctr"/>
+          <a:lstStyle/>
+          <a:p>
+            <a:pPr algn="ctr"/>
+            <a:endParaRPr lang="en-IT"/>
+          </a:p>
+        </p:txBody>
+      </p:sp>
+      <p:sp>
+        <p:nvSpPr>
+          <p:cNvPr id="7" name="TextBox 6">
+            <a:extLst>
+              <a:ext uri="{FF2B5EF4-FFF2-40B4-BE49-F238E27FC236}">
+                <a16:creationId xmlns:a16="http://schemas.microsoft.com/office/drawing/2014/main" id="{1E946B48-7676-EF47-9E0B-B2CEA9C617CA}"/>
+              </a:ext>
+            </a:extLst>
+          </p:cNvPr>
+          <p:cNvSpPr txBox="1"/>
+          <p:nvPr/>
+        </p:nvSpPr>
+        <p:spPr>
+          <a:xfrm>
+            <a:off x="11458330" y="2175309"/>
+            <a:ext cx="553998" cy="3830855"/>
+          </a:xfrm>
+          <a:prstGeom prst="rect">
+            <a:avLst/>
+          </a:prstGeom>
+          <a:noFill/>
+        </p:spPr>
+        <p:txBody>
+          <a:bodyPr vert="vert" wrap="square" rtlCol="0">
+            <a:spAutoFit/>
+          </a:bodyPr>
+          <a:lstStyle/>
+          <a:p>
+            <a:pPr algn="ctr"/>
+            <a:r>
+              <a:rPr lang="en-IT" sz="2400" spc="300" dirty="0">
+                <a:cs typeface="Arial" panose="020B0604020202020204" pitchFamily="34" charset="0"/>
+              </a:rPr>
+              <a:t>Overhead effort</a:t>
+            </a:r>
           </a:p>
         </p:txBody>
       </p:sp>
@@ -6530,12 +7376,12 @@
         <p:spPr/>
         <p:txBody>
           <a:bodyPr>
-            <a:normAutofit fontScale="92500"/>
+            <a:normAutofit/>
           </a:bodyPr>
           <a:lstStyle/>
           <a:p>
             <a:r>
-              <a:rPr lang="en-GB" dirty="0"/>
+              <a:rPr lang="en-GB" sz="2600" dirty="0"/>
               <a:t>Running an experiment…</a:t>
             </a:r>
           </a:p>
@@ -6545,7 +7391,7 @@
               <a:buChar char="§"/>
             </a:pPr>
             <a:r>
-              <a:rPr lang="en-GB" dirty="0"/>
+              <a:rPr lang="en-GB" sz="2200" dirty="0"/>
               <a:t>Hard time constraints</a:t>
             </a:r>
           </a:p>
@@ -6555,7 +7401,7 @@
               <a:buChar char="§"/>
             </a:pPr>
             <a:r>
-              <a:rPr lang="en-GB" dirty="0"/>
+              <a:rPr lang="en-GB" sz="2200" dirty="0"/>
               <a:t>Setup complexity</a:t>
             </a:r>
           </a:p>
@@ -6565,7 +7411,7 @@
               <a:buChar char="§"/>
             </a:pPr>
             <a:r>
-              <a:rPr lang="en-GB" dirty="0"/>
+              <a:rPr lang="en-GB" sz="2200" dirty="0"/>
               <a:t>Stress</a:t>
             </a:r>
           </a:p>
@@ -6577,9 +7423,16 @@
             <a:endParaRPr lang="en-GB" dirty="0"/>
           </a:p>
           <a:p>
-            <a:r>
-              <a:rPr lang="en-GB" dirty="0"/>
-              <a:t>Requires…</a:t>
+            <a:endParaRPr lang="en-GB" sz="2600" dirty="0"/>
+          </a:p>
+          <a:p>
+            <a:r>
+              <a:rPr lang="en-GB" sz="2600" dirty="0"/>
+              <a:t>I</a:t>
+            </a:r>
+            <a:r>
+              <a:rPr lang="en-IT" sz="2600" dirty="0"/>
+              <a:t>ssues</a:t>
             </a:r>
           </a:p>
           <a:p>
@@ -6588,8 +7441,8 @@
               <a:buChar char="§"/>
             </a:pPr>
             <a:r>
-              <a:rPr lang="en-GB" dirty="0"/>
-              <a:t>Repeatability (automatized repetitive actions)</a:t>
+              <a:rPr lang="en-IT" sz="2200" dirty="0"/>
+              <a:t>Yarpmanager covers a lot</a:t>
             </a:r>
           </a:p>
           <a:p>
@@ -6598,8 +7451,64 @@
               <a:buChar char="§"/>
             </a:pPr>
             <a:r>
-              <a:rPr lang="en-GB" dirty="0"/>
-              <a:t>Centralized control and visualization</a:t>
+              <a:rPr lang="en-IT" sz="2200" dirty="0"/>
+              <a:t>Yet, are not handled:</a:t>
+            </a:r>
+          </a:p>
+          <a:p>
+            <a:pPr lvl="2">
+              <a:buFont typeface="Wingdings" pitchFamily="2" charset="2"/>
+              <a:buChar char="§"/>
+            </a:pPr>
+            <a:r>
+              <a:rPr lang="en-IT" sz="1800" dirty="0"/>
+              <a:t>RPC ports</a:t>
+            </a:r>
+          </a:p>
+          <a:p>
+            <a:pPr lvl="2">
+              <a:buFont typeface="Wingdings" pitchFamily="2" charset="2"/>
+              <a:buChar char="§"/>
+            </a:pPr>
+            <a:r>
+              <a:rPr lang="en-IT" sz="1800" dirty="0"/>
+              <a:t>third party visualization tools.</a:t>
+            </a:r>
+          </a:p>
+          <a:p>
+            <a:pPr marL="0" indent="0">
+              <a:buNone/>
+            </a:pPr>
+            <a:endParaRPr lang="en-GB" dirty="0"/>
+          </a:p>
+        </p:txBody>
+      </p:sp>
+      <p:sp>
+        <p:nvSpPr>
+          <p:cNvPr id="2" name="Content Placeholder 1">
+            <a:extLst>
+              <a:ext uri="{FF2B5EF4-FFF2-40B4-BE49-F238E27FC236}">
+                <a16:creationId xmlns:a16="http://schemas.microsoft.com/office/drawing/2014/main" id="{73427D62-FA99-7F42-A11B-A60568C1918F}"/>
+              </a:ext>
+            </a:extLst>
+          </p:cNvPr>
+          <p:cNvSpPr>
+            <a:spLocks noGrp="1"/>
+          </p:cNvSpPr>
+          <p:nvPr>
+            <p:ph sz="half" idx="2"/>
+          </p:nvPr>
+        </p:nvSpPr>
+        <p:spPr/>
+        <p:txBody>
+          <a:bodyPr>
+            <a:normAutofit/>
+          </a:bodyPr>
+          <a:lstStyle/>
+          <a:p>
+            <a:r>
+              <a:rPr lang="en-GB" sz="2600" dirty="0"/>
+              <a:t>Requires…</a:t>
             </a:r>
           </a:p>
           <a:p>
@@ -6608,8 +7517,8 @@
               <a:buChar char="§"/>
             </a:pPr>
             <a:r>
-              <a:rPr lang="en-IT" dirty="0"/>
-              <a:t>Flexibility (easy selection of telemetry data)</a:t>
+              <a:rPr lang="en-GB" sz="2200" dirty="0"/>
+              <a:t>Repeatability (automatized repetitive actions)</a:t>
             </a:r>
           </a:p>
           <a:p>
@@ -6618,40 +7527,8 @@
               <a:buChar char="§"/>
             </a:pPr>
             <a:r>
-              <a:rPr lang="en-IT" dirty="0"/>
-              <a:t>Robustness (survive robot interface reboot)</a:t>
-            </a:r>
-          </a:p>
-        </p:txBody>
-      </p:sp>
-      <p:sp>
-        <p:nvSpPr>
-          <p:cNvPr id="2" name="Content Placeholder 1">
-            <a:extLst>
-              <a:ext uri="{FF2B5EF4-FFF2-40B4-BE49-F238E27FC236}">
-                <a16:creationId xmlns:a16="http://schemas.microsoft.com/office/drawing/2014/main" id="{73427D62-FA99-7F42-A11B-A60568C1918F}"/>
-              </a:ext>
-            </a:extLst>
-          </p:cNvPr>
-          <p:cNvSpPr>
-            <a:spLocks noGrp="1"/>
-          </p:cNvSpPr>
-          <p:nvPr>
-            <p:ph sz="half" idx="2"/>
-          </p:nvPr>
-        </p:nvSpPr>
-        <p:spPr/>
-        <p:txBody>
-          <a:bodyPr/>
-          <a:lstStyle/>
-          <a:p>
-            <a:r>
-              <a:rPr lang="en-GB" dirty="0"/>
-              <a:t>I</a:t>
-            </a:r>
-            <a:r>
-              <a:rPr lang="en-IT" dirty="0"/>
-              <a:t>ssues</a:t>
+              <a:rPr lang="en-GB" sz="2200" dirty="0"/>
+              <a:t>Centralized control and visualization</a:t>
             </a:r>
           </a:p>
           <a:p>
@@ -6660,9 +7537,25 @@
               <a:buChar char="§"/>
             </a:pPr>
             <a:r>
-              <a:rPr lang="en-IT" dirty="0"/>
-              <a:t>Yarpmanager doesn not handle RPC ports nor third party visualization tools.</a:t>
-            </a:r>
+              <a:rPr lang="en-IT" sz="2200" dirty="0"/>
+              <a:t>Flexibility (easy selection of telemetry data)</a:t>
+            </a:r>
+          </a:p>
+          <a:p>
+            <a:pPr lvl="1">
+              <a:buFont typeface="Wingdings" pitchFamily="2" charset="2"/>
+              <a:buChar char="§"/>
+            </a:pPr>
+            <a:r>
+              <a:rPr lang="en-IT" sz="2200" dirty="0"/>
+              <a:t>Robustness (survive robot interface reboot)</a:t>
+            </a:r>
+          </a:p>
+          <a:p>
+            <a:pPr marL="0" indent="0">
+              <a:buNone/>
+            </a:pPr>
+            <a:endParaRPr lang="en-IT" sz="2600" dirty="0"/>
           </a:p>
         </p:txBody>
       </p:sp>

</xml_diff>

<commit_message>
Installing & running, next steps completed
</commit_message>
<xml_diff>
--- a/slides/XTeam_RI_Vertical_iCubTelemetryVisualizer_05102021.pptx
+++ b/slides/XTeam_RI_Vertical_iCubTelemetryVisualizer_05102021.pptx
@@ -145,7 +145,7 @@
   <pc:docChgLst>
     <pc:chgData name="Nuno Guedelha" userId="29104595-6a0a-4bf9-8eeb-db486a0f9440" providerId="ADAL" clId="{DD22962B-5ACF-1144-BBEF-D63FE04529BF}"/>
     <pc:docChg chg="undo redo custSel addSld delSld modSld sldOrd addMainMaster delMainMaster modMainMaster">
-      <pc:chgData name="Nuno Guedelha" userId="29104595-6a0a-4bf9-8eeb-db486a0f9440" providerId="ADAL" clId="{DD22962B-5ACF-1144-BBEF-D63FE04529BF}" dt="2021-10-03T20:11:37.249" v="1573" actId="2696"/>
+      <pc:chgData name="Nuno Guedelha" userId="29104595-6a0a-4bf9-8eeb-db486a0f9440" providerId="ADAL" clId="{DD22962B-5ACF-1144-BBEF-D63FE04529BF}" dt="2021-10-04T01:39:17.961" v="2869" actId="12"/>
       <pc:docMkLst>
         <pc:docMk/>
       </pc:docMkLst>
@@ -710,12 +710,60 @@
           </ac:spMkLst>
         </pc:spChg>
       </pc:sldChg>
-      <pc:sldChg chg="add">
-        <pc:chgData name="Nuno Guedelha" userId="29104595-6a0a-4bf9-8eeb-db486a0f9440" providerId="ADAL" clId="{DD22962B-5ACF-1144-BBEF-D63FE04529BF}" dt="2021-10-03T03:34:10.042" v="146"/>
+      <pc:sldChg chg="addSp modSp add mod modClrScheme chgLayout">
+        <pc:chgData name="Nuno Guedelha" userId="29104595-6a0a-4bf9-8eeb-db486a0f9440" providerId="ADAL" clId="{DD22962B-5ACF-1144-BBEF-D63FE04529BF}" dt="2021-10-04T01:31:19.870" v="2859" actId="20577"/>
         <pc:sldMkLst>
           <pc:docMk/>
           <pc:sldMk cId="974064988" sldId="262"/>
         </pc:sldMkLst>
+        <pc:spChg chg="mod ord">
+          <ac:chgData name="Nuno Guedelha" userId="29104595-6a0a-4bf9-8eeb-db486a0f9440" providerId="ADAL" clId="{DD22962B-5ACF-1144-BBEF-D63FE04529BF}" dt="2021-10-04T01:09:53.080" v="2693" actId="700"/>
+          <ac:spMkLst>
+            <pc:docMk/>
+            <pc:sldMk cId="974064988" sldId="262"/>
+            <ac:spMk id="2" creationId="{4256AEE0-09E3-E448-ABD4-6B95B5AFC23E}"/>
+          </ac:spMkLst>
+        </pc:spChg>
+        <pc:spChg chg="mod ord">
+          <ac:chgData name="Nuno Guedelha" userId="29104595-6a0a-4bf9-8eeb-db486a0f9440" providerId="ADAL" clId="{DD22962B-5ACF-1144-BBEF-D63FE04529BF}" dt="2021-10-04T01:10:40.103" v="2701" actId="20577"/>
+          <ac:spMkLst>
+            <pc:docMk/>
+            <pc:sldMk cId="974064988" sldId="262"/>
+            <ac:spMk id="3" creationId="{3A996973-35A7-E140-B3A5-B6A24371B5B7}"/>
+          </ac:spMkLst>
+        </pc:spChg>
+        <pc:spChg chg="mod ord">
+          <ac:chgData name="Nuno Guedelha" userId="29104595-6a0a-4bf9-8eeb-db486a0f9440" providerId="ADAL" clId="{DD22962B-5ACF-1144-BBEF-D63FE04529BF}" dt="2021-10-04T01:09:53.080" v="2693" actId="700"/>
+          <ac:spMkLst>
+            <pc:docMk/>
+            <pc:sldMk cId="974064988" sldId="262"/>
+            <ac:spMk id="4" creationId="{8E24865B-409C-6B43-84E6-066BC117A1C7}"/>
+          </ac:spMkLst>
+        </pc:spChg>
+        <pc:spChg chg="mod ord">
+          <ac:chgData name="Nuno Guedelha" userId="29104595-6a0a-4bf9-8eeb-db486a0f9440" providerId="ADAL" clId="{DD22962B-5ACF-1144-BBEF-D63FE04529BF}" dt="2021-10-04T01:09:53.080" v="2693" actId="700"/>
+          <ac:spMkLst>
+            <pc:docMk/>
+            <pc:sldMk cId="974064988" sldId="262"/>
+            <ac:spMk id="5" creationId="{CDA1594A-18F9-4541-BD40-59197D71EDE9}"/>
+          </ac:spMkLst>
+        </pc:spChg>
+        <pc:spChg chg="mod ord">
+          <ac:chgData name="Nuno Guedelha" userId="29104595-6a0a-4bf9-8eeb-db486a0f9440" providerId="ADAL" clId="{DD22962B-5ACF-1144-BBEF-D63FE04529BF}" dt="2021-10-04T01:09:53.080" v="2693" actId="700"/>
+          <ac:spMkLst>
+            <pc:docMk/>
+            <pc:sldMk cId="974064988" sldId="262"/>
+            <ac:spMk id="6" creationId="{8C02A304-6E6D-FD4D-BE63-69925ED1CD80}"/>
+          </ac:spMkLst>
+        </pc:spChg>
+        <pc:spChg chg="add mod ord">
+          <ac:chgData name="Nuno Guedelha" userId="29104595-6a0a-4bf9-8eeb-db486a0f9440" providerId="ADAL" clId="{DD22962B-5ACF-1144-BBEF-D63FE04529BF}" dt="2021-10-04T01:31:19.870" v="2859" actId="20577"/>
+          <ac:spMkLst>
+            <pc:docMk/>
+            <pc:sldMk cId="974064988" sldId="262"/>
+            <ac:spMk id="7" creationId="{C3CB9815-48AB-BF42-BB78-1AD1D566C3ED}"/>
+          </ac:spMkLst>
+        </pc:spChg>
       </pc:sldChg>
       <pc:sldChg chg="modSp new mod">
         <pc:chgData name="Nuno Guedelha" userId="29104595-6a0a-4bf9-8eeb-db486a0f9440" providerId="ADAL" clId="{DD22962B-5ACF-1144-BBEF-D63FE04529BF}" dt="2021-10-03T03:35:20.625" v="189" actId="20577"/>
@@ -792,20 +840,52 @@
           </ac:spMkLst>
         </pc:spChg>
       </pc:sldChg>
-      <pc:sldChg chg="modSp new">
-        <pc:chgData name="Nuno Guedelha" userId="29104595-6a0a-4bf9-8eeb-db486a0f9440" providerId="ADAL" clId="{DD22962B-5ACF-1144-BBEF-D63FE04529BF}" dt="2021-10-03T03:37:47.522" v="202"/>
+      <pc:sldChg chg="addSp delSp modSp new mod">
+        <pc:chgData name="Nuno Guedelha" userId="29104595-6a0a-4bf9-8eeb-db486a0f9440" providerId="ADAL" clId="{DD22962B-5ACF-1144-BBEF-D63FE04529BF}" dt="2021-10-04T01:39:17.961" v="2869" actId="12"/>
         <pc:sldMkLst>
           <pc:docMk/>
           <pc:sldMk cId="1984518357" sldId="268"/>
         </pc:sldMkLst>
         <pc:spChg chg="mod">
-          <ac:chgData name="Nuno Guedelha" userId="29104595-6a0a-4bf9-8eeb-db486a0f9440" providerId="ADAL" clId="{DD22962B-5ACF-1144-BBEF-D63FE04529BF}" dt="2021-10-03T03:37:47.522" v="202"/>
+          <ac:chgData name="Nuno Guedelha" userId="29104595-6a0a-4bf9-8eeb-db486a0f9440" providerId="ADAL" clId="{DD22962B-5ACF-1144-BBEF-D63FE04529BF}" dt="2021-10-04T01:06:40.952" v="2652" actId="20577"/>
           <ac:spMkLst>
             <pc:docMk/>
             <pc:sldMk cId="1984518357" sldId="268"/>
             <ac:spMk id="2" creationId="{7FC5E85F-D7F1-B247-BF97-B50910E1DF47}"/>
           </ac:spMkLst>
         </pc:spChg>
+        <pc:spChg chg="mod">
+          <ac:chgData name="Nuno Guedelha" userId="29104595-6a0a-4bf9-8eeb-db486a0f9440" providerId="ADAL" clId="{DD22962B-5ACF-1144-BBEF-D63FE04529BF}" dt="2021-10-04T01:39:17.961" v="2869" actId="12"/>
+          <ac:spMkLst>
+            <pc:docMk/>
+            <pc:sldMk cId="1984518357" sldId="268"/>
+            <ac:spMk id="3" creationId="{B53A0C7D-E945-F84F-BB8B-7555D27A7D4A}"/>
+          </ac:spMkLst>
+        </pc:spChg>
+        <pc:picChg chg="add del mod">
+          <ac:chgData name="Nuno Guedelha" userId="29104595-6a0a-4bf9-8eeb-db486a0f9440" providerId="ADAL" clId="{DD22962B-5ACF-1144-BBEF-D63FE04529BF}" dt="2021-10-03T23:07:02.368" v="2119" actId="478"/>
+          <ac:picMkLst>
+            <pc:docMk/>
+            <pc:sldMk cId="1984518357" sldId="268"/>
+            <ac:picMk id="11" creationId="{159BBACE-7AAA-F74E-A018-18B0591C9171}"/>
+          </ac:picMkLst>
+        </pc:picChg>
+        <pc:picChg chg="add del mod">
+          <ac:chgData name="Nuno Guedelha" userId="29104595-6a0a-4bf9-8eeb-db486a0f9440" providerId="ADAL" clId="{DD22962B-5ACF-1144-BBEF-D63FE04529BF}" dt="2021-10-04T00:32:29.047" v="2144" actId="478"/>
+          <ac:picMkLst>
+            <pc:docMk/>
+            <pc:sldMk cId="1984518357" sldId="268"/>
+            <ac:picMk id="1026" creationId="{B1C11A7B-543D-FB41-ADC2-7FB8A497CDF4}"/>
+          </ac:picMkLst>
+        </pc:picChg>
+        <pc:cxnChg chg="add del mod">
+          <ac:chgData name="Nuno Guedelha" userId="29104595-6a0a-4bf9-8eeb-db486a0f9440" providerId="ADAL" clId="{DD22962B-5ACF-1144-BBEF-D63FE04529BF}" dt="2021-10-03T21:26:02.703" v="1806" actId="11529"/>
+          <ac:cxnSpMkLst>
+            <pc:docMk/>
+            <pc:sldMk cId="1984518357" sldId="268"/>
+            <ac:cxnSpMk id="8" creationId="{F65551F7-6EE6-F64B-9A8D-7C59ABE4C586}"/>
+          </ac:cxnSpMkLst>
+        </pc:cxnChg>
       </pc:sldChg>
       <pc:sldChg chg="addSp delSp modSp add mod ord modClrScheme chgLayout">
         <pc:chgData name="Nuno Guedelha" userId="29104595-6a0a-4bf9-8eeb-db486a0f9440" providerId="ADAL" clId="{DD22962B-5ACF-1144-BBEF-D63FE04529BF}" dt="2021-10-03T19:40:27.208" v="1288" actId="27636"/>
@@ -5848,37 +5928,352 @@
           <a:p>
             <a:r>
               <a:rPr lang="en-GB" dirty="0"/>
-              <a:t>Installation, parametrization and launching</a:t>
+              <a:t>Installing, parametrizing and launching</a:t>
             </a:r>
             <a:endParaRPr lang="en-IT" dirty="0"/>
           </a:p>
         </p:txBody>
       </p:sp>
-      <p:sp>
-        <p:nvSpPr>
-          <p:cNvPr id="3" name="Content Placeholder 2">
-            <a:extLst>
-              <a:ext uri="{FF2B5EF4-FFF2-40B4-BE49-F238E27FC236}">
-                <a16:creationId xmlns:a16="http://schemas.microsoft.com/office/drawing/2014/main" id="{B53A0C7D-E945-F84F-BB8B-7555D27A7D4A}"/>
-              </a:ext>
-            </a:extLst>
-          </p:cNvPr>
-          <p:cNvSpPr>
-            <a:spLocks noGrp="1"/>
-          </p:cNvSpPr>
-          <p:nvPr>
-            <p:ph idx="1"/>
-          </p:nvPr>
-        </p:nvSpPr>
-        <p:spPr/>
-        <p:txBody>
-          <a:bodyPr/>
-          <a:lstStyle/>
-          <a:p>
-            <a:endParaRPr lang="en-IT"/>
-          </a:p>
-        </p:txBody>
-      </p:sp>
+      <mc:AlternateContent xmlns:mc="http://schemas.openxmlformats.org/markup-compatibility/2006">
+        <mc:Choice xmlns:a14="http://schemas.microsoft.com/office/drawing/2010/main" Requires="a14">
+          <p:sp>
+            <p:nvSpPr>
+              <p:cNvPr id="3" name="Content Placeholder 2">
+                <a:extLst>
+                  <a:ext uri="{FF2B5EF4-FFF2-40B4-BE49-F238E27FC236}">
+                    <a16:creationId xmlns:a16="http://schemas.microsoft.com/office/drawing/2014/main" id="{B53A0C7D-E945-F84F-BB8B-7555D27A7D4A}"/>
+                  </a:ext>
+                </a:extLst>
+              </p:cNvPr>
+              <p:cNvSpPr>
+                <a:spLocks noGrp="1"/>
+              </p:cNvSpPr>
+              <p:nvPr>
+                <p:ph idx="1"/>
+              </p:nvPr>
+            </p:nvSpPr>
+            <p:spPr/>
+            <p:txBody>
+              <a:bodyPr>
+                <a:normAutofit fontScale="62500" lnSpcReduction="20000"/>
+              </a:bodyPr>
+              <a:lstStyle/>
+              <a:p>
+                <a:pPr marL="0" indent="0">
+                  <a:buNone/>
+                </a:pPr>
+                <a:r>
+                  <a:rPr lang="en-IT" dirty="0"/>
+                  <a:t>🛠 Installing (</a:t>
+                </a:r>
+                <a:r>
+                  <a:rPr lang="en-GB" dirty="0">
+                    <a:hlinkClick r:id="rId2"/>
+                  </a:rPr>
+                  <a:t>README.md</a:t>
+                </a:r>
+                <a:r>
+                  <a:rPr lang="en-IT" dirty="0"/>
+                  <a:t>)</a:t>
+                </a:r>
+              </a:p>
+              <a:p>
+                <a:pPr lvl="1">
+                  <a:buFont typeface="Wingdings" pitchFamily="2" charset="2"/>
+                  <a:buChar char="§"/>
+                </a:pPr>
+                <a:r>
+                  <a:rPr lang="en-IT" dirty="0"/>
+                  <a:t>NVM	</a:t>
+                </a:r>
+                <a14:m>
+                  <m:oMath xmlns:m="http://schemas.openxmlformats.org/officeDocument/2006/math">
+                    <m:r>
+                      <a:rPr lang="en-IT" i="1" smtClean="0">
+                        <a:latin typeface="Cambria Math" panose="02040503050406030204" pitchFamily="18" charset="0"/>
+                        <a:ea typeface="Cambria Math" panose="02040503050406030204" pitchFamily="18" charset="0"/>
+                      </a:rPr>
+                      <m:t>⟶</m:t>
+                    </m:r>
+                  </m:oMath>
+                </a14:m>
+                <a:r>
+                  <a:rPr lang="en-IT" dirty="0"/>
+                  <a:t> Node.js/npm version management</a:t>
+                </a:r>
+              </a:p>
+              <a:p>
+                <a:pPr lvl="1">
+                  <a:buFont typeface="Wingdings" pitchFamily="2" charset="2"/>
+                  <a:buChar char="§"/>
+                </a:pPr>
+                <a:r>
+                  <a:rPr lang="en-IT" dirty="0"/>
+                  <a:t>Mamba	</a:t>
+                </a:r>
+                <a14:m>
+                  <m:oMath xmlns:m="http://schemas.openxmlformats.org/officeDocument/2006/math">
+                    <m:r>
+                      <a:rPr lang="en-IT" i="1">
+                        <a:latin typeface="Cambria Math" panose="02040503050406030204" pitchFamily="18" charset="0"/>
+                        <a:ea typeface="Cambria Math" panose="02040503050406030204" pitchFamily="18" charset="0"/>
+                      </a:rPr>
+                      <m:t>⟶</m:t>
+                    </m:r>
+                  </m:oMath>
+                </a14:m>
+                <a:r>
+                  <a:rPr lang="en-IT" dirty="0"/>
+                  <a:t> dependencies (outside </a:t>
+                </a:r>
+                <a:r>
+                  <a:rPr lang="en-IT" b="1" dirty="0"/>
+                  <a:t>npm</a:t>
+                </a:r>
+                <a:r>
+                  <a:rPr lang="en-IT" dirty="0"/>
+                  <a:t>)</a:t>
+                </a:r>
+              </a:p>
+              <a:p>
+                <a:pPr marL="457200" lvl="1" indent="0">
+                  <a:buNone/>
+                  <a:tabLst>
+                    <a:tab pos="2262188" algn="l"/>
+                  </a:tabLst>
+                </a:pPr>
+                <a:r>
+                  <a:rPr lang="en-IT" dirty="0"/>
+                  <a:t>	</a:t>
+                </a:r>
+                <a:r>
+                  <a:rPr lang="en-IT" b="1" i="1" dirty="0"/>
+                  <a:t>robotology</a:t>
+                </a:r>
+                <a:r>
+                  <a:rPr lang="en-IT" dirty="0"/>
+                  <a:t> conda channel (YARP, C</a:t>
+                </a:r>
+                <a:r>
+                  <a:rPr lang="en-GB" dirty="0"/>
+                  <a:t>m</a:t>
+                </a:r>
+                <a:r>
+                  <a:rPr lang="en-IT" dirty="0"/>
+                  <a:t>ake, C++ compilers)</a:t>
+                </a:r>
+              </a:p>
+              <a:p>
+                <a:pPr lvl="1">
+                  <a:buFont typeface="Wingdings" pitchFamily="2" charset="2"/>
+                  <a:buChar char="§"/>
+                  <a:tabLst>
+                    <a:tab pos="2262188" algn="l"/>
+                  </a:tabLst>
+                </a:pPr>
+                <a:r>
+                  <a:rPr lang="en-GB" dirty="0">
+                    <a:hlinkClick r:id="rId3"/>
+                  </a:rPr>
+                  <a:t>https://github.com/dic-iit/yarp-openmct.git</a:t>
+                </a:r>
+                <a:endParaRPr lang="en-GB" dirty="0"/>
+              </a:p>
+              <a:p>
+                <a:pPr lvl="1">
+                  <a:buFont typeface="Wingdings" pitchFamily="2" charset="2"/>
+                  <a:buChar char="§"/>
+                  <a:tabLst>
+                    <a:tab pos="2262188" algn="l"/>
+                  </a:tabLst>
+                </a:pPr>
+                <a:r>
+                  <a:rPr lang="en-GB" dirty="0" err="1"/>
+                  <a:t>Npm</a:t>
+                </a:r>
+                <a:endParaRPr lang="en-GB" dirty="0"/>
+              </a:p>
+              <a:p>
+                <a:pPr lvl="1">
+                  <a:buFont typeface="Wingdings" pitchFamily="2" charset="2"/>
+                  <a:buChar char="§"/>
+                  <a:tabLst>
+                    <a:tab pos="2262188" algn="l"/>
+                  </a:tabLst>
+                </a:pPr>
+                <a:r>
+                  <a:rPr lang="en-GB" dirty="0"/>
+                  <a:t>Web browser</a:t>
+                </a:r>
+              </a:p>
+              <a:p>
+                <a:pPr marL="0" indent="0">
+                  <a:buNone/>
+                </a:pPr>
+                <a:endParaRPr lang="en-GB" dirty="0"/>
+              </a:p>
+              <a:p>
+                <a:pPr marL="0" indent="0">
+                  <a:buNone/>
+                </a:pPr>
+                <a:r>
+                  <a:rPr lang="en-IT" dirty="0"/>
+                  <a:t>⚙️ </a:t>
+                </a:r>
+                <a:r>
+                  <a:rPr lang="en-GB" dirty="0"/>
+                  <a:t>P</a:t>
+                </a:r>
+                <a:r>
+                  <a:rPr lang="en-IT" dirty="0"/>
+                  <a:t>arametrizing ⏳</a:t>
+                </a:r>
+              </a:p>
+              <a:p>
+                <a:pPr lvl="1">
+                  <a:buFont typeface="Wingdings" pitchFamily="2" charset="2"/>
+                  <a:buChar char="§"/>
+                </a:pPr>
+                <a:r>
+                  <a:rPr lang="en-GB" dirty="0"/>
+                  <a:t>P</a:t>
+                </a:r>
+                <a:r>
+                  <a:rPr lang="en-IT" dirty="0"/>
+                  <a:t>ort configuration (Yarp &amp; local names, type)</a:t>
+                </a:r>
+              </a:p>
+              <a:p>
+                <a:pPr lvl="1">
+                  <a:buFont typeface="Wingdings" pitchFamily="2" charset="2"/>
+                  <a:buChar char="§"/>
+                </a:pPr>
+                <a:r>
+                  <a:rPr lang="en-GB" dirty="0"/>
+                  <a:t>C</a:t>
+                </a:r>
+                <a:r>
+                  <a:rPr lang="en-IT" dirty="0"/>
+                  <a:t>onnection ON/OFF/Detect</a:t>
+                </a:r>
+              </a:p>
+              <a:p>
+                <a:pPr lvl="1">
+                  <a:buFont typeface="Wingdings" pitchFamily="2" charset="2"/>
+                  <a:buChar char="§"/>
+                </a:pPr>
+                <a:r>
+                  <a:rPr lang="en-IT" dirty="0"/>
+                  <a:t>RPC commands</a:t>
+                </a:r>
+              </a:p>
+              <a:p>
+                <a:endParaRPr lang="en-IT" dirty="0"/>
+              </a:p>
+              <a:p>
+                <a:pPr marL="0" indent="0">
+                  <a:buNone/>
+                </a:pPr>
+                <a:r>
+                  <a:rPr lang="en-IT" dirty="0"/>
+                  <a:t>▶︎</a:t>
+                </a:r>
+                <a:r>
+                  <a:rPr lang="en-GB" dirty="0"/>
+                  <a:t> R</a:t>
+                </a:r>
+                <a:r>
+                  <a:rPr lang="en-IT" dirty="0"/>
+                  <a:t>unning</a:t>
+                </a:r>
+              </a:p>
+              <a:p>
+                <a:pPr marL="914400" lvl="1" indent="-457200">
+                  <a:buFont typeface="+mj-lt"/>
+                  <a:buAutoNum type="arabicPeriod"/>
+                </a:pPr>
+                <a:r>
+                  <a:rPr lang="en-GB" dirty="0"/>
+                  <a:t>C</a:t>
+                </a:r>
+                <a:r>
+                  <a:rPr lang="en-IT" dirty="0"/>
+                  <a:t>onnect to robot network</a:t>
+                </a:r>
+              </a:p>
+              <a:p>
+                <a:pPr marL="914400" lvl="1" indent="-457200">
+                  <a:buFont typeface="+mj-lt"/>
+                  <a:buAutoNum type="arabicPeriod"/>
+                </a:pPr>
+                <a:r>
+                  <a:rPr lang="en-IT" dirty="0"/>
+                  <a:t>&gt; npm start</a:t>
+                </a:r>
+              </a:p>
+              <a:p>
+                <a:pPr marL="914400" lvl="1" indent="-457200">
+                  <a:buFont typeface="+mj-lt"/>
+                  <a:buAutoNum type="arabicPeriod"/>
+                </a:pPr>
+                <a:r>
+                  <a:rPr lang="en-GB" dirty="0"/>
+                  <a:t>🌐 Open-MCT viz: &lt;server-IP-address&gt;:8080</a:t>
+                </a:r>
+              </a:p>
+              <a:p>
+                <a:pPr marL="914400" lvl="1" indent="-457200">
+                  <a:buFont typeface="+mj-lt"/>
+                  <a:buAutoNum type="arabicPeriod"/>
+                </a:pPr>
+                <a:r>
+                  <a:rPr lang="en-GB" dirty="0"/>
+                  <a:t>🌐 CTRL console: &lt;server-IP-address&gt;:3000</a:t>
+                </a:r>
+              </a:p>
+            </p:txBody>
+          </p:sp>
+        </mc:Choice>
+        <mc:Fallback>
+          <p:sp>
+            <p:nvSpPr>
+              <p:cNvPr id="3" name="Content Placeholder 2">
+                <a:extLst>
+                  <a:ext uri="{FF2B5EF4-FFF2-40B4-BE49-F238E27FC236}">
+                    <a16:creationId xmlns:a16="http://schemas.microsoft.com/office/drawing/2014/main" id="{B53A0C7D-E945-F84F-BB8B-7555D27A7D4A}"/>
+                  </a:ext>
+                </a:extLst>
+              </p:cNvPr>
+              <p:cNvSpPr>
+                <a:spLocks noGrp="1" noRot="1" noChangeAspect="1" noMove="1" noResize="1" noEditPoints="1" noAdjustHandles="1" noChangeArrowheads="1" noChangeShapeType="1" noTextEdit="1"/>
+              </p:cNvSpPr>
+              <p:nvPr>
+                <p:ph idx="1"/>
+              </p:nvPr>
+            </p:nvSpPr>
+            <p:spPr>
+              <a:blipFill>
+                <a:blip r:embed="rId4"/>
+                <a:stretch>
+                  <a:fillRect l="-603" t="-2128"/>
+                </a:stretch>
+              </a:blipFill>
+            </p:spPr>
+            <p:txBody>
+              <a:bodyPr/>
+              <a:lstStyle/>
+              <a:p>
+                <a:r>
+                  <a:rPr lang="en-IT">
+                    <a:noFill/>
+                  </a:rPr>
+                  <a:t> </a:t>
+                </a:r>
+              </a:p>
+            </p:txBody>
+          </p:sp>
+        </mc:Fallback>
+      </mc:AlternateContent>
       <p:sp>
         <p:nvSpPr>
           <p:cNvPr id="4" name="Date Placeholder 3">
@@ -5998,18 +6393,18 @@
       </p:grpSpPr>
       <p:sp>
         <p:nvSpPr>
-          <p:cNvPr id="2" name="Title 1">
-            <a:extLst>
-              <a:ext uri="{FF2B5EF4-FFF2-40B4-BE49-F238E27FC236}">
-                <a16:creationId xmlns:a16="http://schemas.microsoft.com/office/drawing/2014/main" id="{4256AEE0-09E3-E448-ABD4-6B95B5AFC23E}"/>
-              </a:ext>
-            </a:extLst>
-          </p:cNvPr>
-          <p:cNvSpPr>
-            <a:spLocks noGrp="1"/>
-          </p:cNvSpPr>
-          <p:nvPr>
-            <p:ph type="title"/>
+          <p:cNvPr id="3" name="Content Placeholder 2">
+            <a:extLst>
+              <a:ext uri="{FF2B5EF4-FFF2-40B4-BE49-F238E27FC236}">
+                <a16:creationId xmlns:a16="http://schemas.microsoft.com/office/drawing/2014/main" id="{3A996973-35A7-E140-B3A5-B6A24371B5B7}"/>
+              </a:ext>
+            </a:extLst>
+          </p:cNvPr>
+          <p:cNvSpPr>
+            <a:spLocks noGrp="1"/>
+          </p:cNvSpPr>
+          <p:nvPr>
+            <p:ph sz="half" idx="1"/>
           </p:nvPr>
         </p:nvSpPr>
         <p:spPr/>
@@ -6018,26 +6413,107 @@
           <a:lstStyle/>
           <a:p>
             <a:r>
+              <a:rPr lang="en-IT" sz="2600" dirty="0"/>
+              <a:t>Tested on iCubGenova04</a:t>
+            </a:r>
+          </a:p>
+          <a:p>
+            <a:pPr lvl="1">
+              <a:buFont typeface="Wingdings" pitchFamily="2" charset="2"/>
+              <a:buChar char="§"/>
+            </a:pPr>
+            <a:r>
+              <a:rPr lang="en-US" sz="2200" dirty="0"/>
+              <a:t>Running modules and app from terminal</a:t>
+            </a:r>
+            <a:endParaRPr lang="en-IT" sz="2200" dirty="0"/>
+          </a:p>
+          <a:p>
+            <a:pPr lvl="1">
+              <a:buFont typeface="Wingdings" pitchFamily="2" charset="2"/>
+              <a:buChar char="§"/>
+            </a:pPr>
+            <a:r>
+              <a:rPr lang="en-IT" sz="2200" dirty="0"/>
+              <a:t>Controle console</a:t>
+            </a:r>
+          </a:p>
+          <a:p>
+            <a:pPr lvl="2">
+              <a:buFont typeface="Wingdings" pitchFamily="2" charset="2"/>
+              <a:buChar char="Ø"/>
+            </a:pPr>
+            <a:r>
               <a:rPr lang="en-IT" dirty="0"/>
-              <a:t>Deployment and Next Steps</a:t>
-            </a:r>
-          </a:p>
-        </p:txBody>
-      </p:sp>
-      <p:sp>
-        <p:nvSpPr>
-          <p:cNvPr id="3" name="Content Placeholder 2">
-            <a:extLst>
-              <a:ext uri="{FF2B5EF4-FFF2-40B4-BE49-F238E27FC236}">
-                <a16:creationId xmlns:a16="http://schemas.microsoft.com/office/drawing/2014/main" id="{3A996973-35A7-E140-B3A5-B6A24371B5B7}"/>
-              </a:ext>
-            </a:extLst>
-          </p:cNvPr>
-          <p:cNvSpPr>
-            <a:spLocks noGrp="1"/>
-          </p:cNvSpPr>
-          <p:nvPr>
-            <p:ph idx="1"/>
+              <a:t>RPC commands</a:t>
+            </a:r>
+          </a:p>
+          <a:p>
+            <a:pPr lvl="2">
+              <a:buFont typeface="Wingdings" pitchFamily="2" charset="2"/>
+              <a:buChar char="Ø"/>
+            </a:pPr>
+            <a:r>
+              <a:rPr lang="en-IT" dirty="0"/>
+              <a:t>Network Ping</a:t>
+            </a:r>
+          </a:p>
+          <a:p>
+            <a:pPr lvl="1">
+              <a:buFont typeface="Wingdings" pitchFamily="2" charset="2"/>
+              <a:buChar char="§"/>
+            </a:pPr>
+            <a:r>
+              <a:rPr lang="en-IT" sz="2200" dirty="0"/>
+              <a:t>Open-MCT based visualizer</a:t>
+            </a:r>
+          </a:p>
+          <a:p>
+            <a:pPr lvl="2">
+              <a:buFont typeface="Wingdings" pitchFamily="2" charset="2"/>
+              <a:buChar char="Ø"/>
+            </a:pPr>
+            <a:r>
+              <a:rPr lang="en-IT" dirty="0"/>
+              <a:t>Individual iCub telemetry entry plots</a:t>
+            </a:r>
+          </a:p>
+          <a:p>
+            <a:pPr lvl="2">
+              <a:buFont typeface="Wingdings" pitchFamily="2" charset="2"/>
+              <a:buChar char="Ø"/>
+            </a:pPr>
+            <a:r>
+              <a:rPr lang="en-GB" dirty="0"/>
+              <a:t>CTRL console</a:t>
+            </a:r>
+          </a:p>
+          <a:p>
+            <a:endParaRPr lang="en-GB" sz="2600" dirty="0"/>
+          </a:p>
+          <a:p>
+            <a:r>
+              <a:rPr lang="en-GB" sz="2600" dirty="0"/>
+              <a:t>Issues analysis in progress…</a:t>
+            </a:r>
+            <a:endParaRPr lang="en-IT" sz="2600" dirty="0"/>
+          </a:p>
+        </p:txBody>
+      </p:sp>
+      <p:sp>
+        <p:nvSpPr>
+          <p:cNvPr id="7" name="Content Placeholder 6">
+            <a:extLst>
+              <a:ext uri="{FF2B5EF4-FFF2-40B4-BE49-F238E27FC236}">
+                <a16:creationId xmlns:a16="http://schemas.microsoft.com/office/drawing/2014/main" id="{C3CB9815-48AB-BF42-BB78-1AD1D566C3ED}"/>
+              </a:ext>
+            </a:extLst>
+          </p:cNvPr>
+          <p:cNvSpPr>
+            <a:spLocks noGrp="1"/>
+          </p:cNvSpPr>
+          <p:nvPr>
+            <p:ph sz="half" idx="2"/>
           </p:nvPr>
         </p:nvSpPr>
         <p:spPr/>
@@ -6045,36 +6521,54 @@
           <a:bodyPr/>
           <a:lstStyle/>
           <a:p>
-            <a:endParaRPr lang="en-IT"/>
-          </a:p>
-        </p:txBody>
-      </p:sp>
-      <p:sp>
-        <p:nvSpPr>
-          <p:cNvPr id="4" name="Date Placeholder 3">
-            <a:extLst>
-              <a:ext uri="{FF2B5EF4-FFF2-40B4-BE49-F238E27FC236}">
-                <a16:creationId xmlns:a16="http://schemas.microsoft.com/office/drawing/2014/main" id="{8E24865B-409C-6B43-84E6-066BC117A1C7}"/>
-              </a:ext>
-            </a:extLst>
-          </p:cNvPr>
-          <p:cNvSpPr>
-            <a:spLocks noGrp="1"/>
-          </p:cNvSpPr>
-          <p:nvPr>
-            <p:ph type="dt" sz="half" idx="10"/>
-          </p:nvPr>
-        </p:nvSpPr>
-        <p:spPr/>
-        <p:txBody>
-          <a:bodyPr/>
-          <a:lstStyle/>
-          <a:p>
-            <a:r>
-              <a:rPr lang="it-IT"/>
-              <a:t>05/10/2021</a:t>
-            </a:r>
-            <a:endParaRPr lang="en-IT"/>
+            <a:r>
+              <a:rPr lang="en-IT" dirty="0"/>
+              <a:t>Next steps</a:t>
+            </a:r>
+          </a:p>
+          <a:p>
+            <a:pPr lvl="1">
+              <a:buFont typeface="Wingdings" pitchFamily="2" charset="2"/>
+              <a:buChar char="Ø"/>
+            </a:pPr>
+            <a:r>
+              <a:rPr lang="en-GB" dirty="0"/>
+              <a:t>Improve runtime stability</a:t>
+            </a:r>
+          </a:p>
+          <a:p>
+            <a:pPr lvl="1">
+              <a:buFont typeface="Wingdings" pitchFamily="2" charset="2"/>
+              <a:buChar char="Ø"/>
+            </a:pPr>
+            <a:r>
+              <a:rPr lang="en-GB" dirty="0"/>
+              <a:t>S</a:t>
+            </a:r>
+            <a:r>
+              <a:rPr lang="en-IT" dirty="0"/>
+              <a:t>tacked &amp; overlay plots</a:t>
+            </a:r>
+          </a:p>
+          <a:p>
+            <a:pPr lvl="1">
+              <a:buFont typeface="Wingdings" pitchFamily="2" charset="2"/>
+              <a:buChar char="Ø"/>
+            </a:pPr>
+            <a:r>
+              <a:rPr lang="en-IT" dirty="0"/>
+              <a:t>Added 3D robot viz</a:t>
+            </a:r>
+          </a:p>
+          <a:p>
+            <a:pPr lvl="1">
+              <a:buFont typeface="Wingdings" pitchFamily="2" charset="2"/>
+              <a:buChar char="Ø"/>
+            </a:pPr>
+            <a:r>
+              <a:rPr lang="en-IT" dirty="0"/>
+              <a:t>Imporve the control GUI</a:t>
+            </a:r>
           </a:p>
         </p:txBody>
       </p:sp>
@@ -6132,6 +6626,63 @@
               <a:rPr lang="en-IT" smtClean="0"/>
               <a:t>12</a:t>
             </a:fld>
+            <a:endParaRPr lang="en-IT"/>
+          </a:p>
+        </p:txBody>
+      </p:sp>
+      <p:sp>
+        <p:nvSpPr>
+          <p:cNvPr id="2" name="Title 1">
+            <a:extLst>
+              <a:ext uri="{FF2B5EF4-FFF2-40B4-BE49-F238E27FC236}">
+                <a16:creationId xmlns:a16="http://schemas.microsoft.com/office/drawing/2014/main" id="{4256AEE0-09E3-E448-ABD4-6B95B5AFC23E}"/>
+              </a:ext>
+            </a:extLst>
+          </p:cNvPr>
+          <p:cNvSpPr>
+            <a:spLocks noGrp="1"/>
+          </p:cNvSpPr>
+          <p:nvPr>
+            <p:ph type="title"/>
+          </p:nvPr>
+        </p:nvSpPr>
+        <p:spPr/>
+        <p:txBody>
+          <a:bodyPr/>
+          <a:lstStyle/>
+          <a:p>
+            <a:r>
+              <a:rPr lang="en-IT" dirty="0"/>
+              <a:t>Deployment and Next Steps</a:t>
+            </a:r>
+          </a:p>
+        </p:txBody>
+      </p:sp>
+      <p:sp>
+        <p:nvSpPr>
+          <p:cNvPr id="4" name="Date Placeholder 3">
+            <a:extLst>
+              <a:ext uri="{FF2B5EF4-FFF2-40B4-BE49-F238E27FC236}">
+                <a16:creationId xmlns:a16="http://schemas.microsoft.com/office/drawing/2014/main" id="{8E24865B-409C-6B43-84E6-066BC117A1C7}"/>
+              </a:ext>
+            </a:extLst>
+          </p:cNvPr>
+          <p:cNvSpPr>
+            <a:spLocks noGrp="1"/>
+          </p:cNvSpPr>
+          <p:nvPr>
+            <p:ph type="dt" sz="half" idx="10"/>
+          </p:nvPr>
+        </p:nvSpPr>
+        <p:spPr/>
+        <p:txBody>
+          <a:bodyPr/>
+          <a:lstStyle/>
+          <a:p>
+            <a:r>
+              <a:rPr lang="it-IT"/>
+              <a:t>05/10/2021</a:t>
+            </a:r>
             <a:endParaRPr lang="en-IT"/>
           </a:p>
         </p:txBody>
@@ -6496,8 +7047,8 @@
           </a:p>
         </p:txBody>
       </p:sp>
-      <mc:AlternateContent xmlns:mc="http://schemas.openxmlformats.org/markup-compatibility/2006">
-        <mc:Choice xmlns:a14="http://schemas.microsoft.com/office/drawing/2010/main" Requires="a14">
+      <mc:AlternateContent xmlns:mc="http://schemas.openxmlformats.org/markup-compatibility/2006" xmlns:a14="http://schemas.microsoft.com/office/drawing/2010/main">
+        <mc:Choice Requires="a14">
           <p:sp>
             <p:nvSpPr>
               <p:cNvPr id="31" name="Content Placeholder 30">
@@ -6544,7 +7095,7 @@
             </p:txBody>
           </p:sp>
         </mc:Choice>
-        <mc:Fallback>
+        <mc:Fallback xmlns="">
           <p:sp>
             <p:nvSpPr>
               <p:cNvPr id="31" name="Content Placeholder 30">
@@ -7889,8 +8440,8 @@
           <a:chExt cx="0" cy="0"/>
         </a:xfrm>
       </p:grpSpPr>
-      <mc:AlternateContent xmlns:mc="http://schemas.openxmlformats.org/markup-compatibility/2006">
-        <mc:Choice xmlns:a14="http://schemas.microsoft.com/office/drawing/2010/main" Requires="a14">
+      <mc:AlternateContent xmlns:mc="http://schemas.openxmlformats.org/markup-compatibility/2006" xmlns:a14="http://schemas.microsoft.com/office/drawing/2010/main">
+        <mc:Choice Requires="a14">
           <p:sp>
             <p:nvSpPr>
               <p:cNvPr id="12" name="Content Placeholder 11">
@@ -8034,7 +8585,7 @@
             </p:txBody>
           </p:sp>
         </mc:Choice>
-        <mc:Fallback>
+        <mc:Fallback xmlns="">
           <p:sp>
             <p:nvSpPr>
               <p:cNvPr id="12" name="Content Placeholder 11">
@@ -8933,13 +9484,13 @@
   <p:clrMapOvr>
     <a:masterClrMapping/>
   </p:clrMapOvr>
-  <mc:AlternateContent xmlns:mc="http://schemas.openxmlformats.org/markup-compatibility/2006">
-    <mc:Choice xmlns:p159="http://schemas.microsoft.com/office/powerpoint/2015/09/main" Requires="p159">
+  <mc:AlternateContent xmlns:mc="http://schemas.openxmlformats.org/markup-compatibility/2006" xmlns:p159="http://schemas.microsoft.com/office/powerpoint/2015/09/main">
+    <mc:Choice Requires="p159">
       <p:transition xmlns:p14="http://schemas.microsoft.com/office/powerpoint/2010/main" spd="slow" p14:dur="2000">
         <p159:morph option="byObject"/>
       </p:transition>
     </mc:Choice>
-    <mc:Fallback>
+    <mc:Fallback xmlns="">
       <p:transition spd="slow">
         <p:fade/>
       </p:transition>
@@ -9458,7 +10009,7 @@
           <a:bodyPr/>
           <a:lstStyle/>
           <a:p>
-            <a:endParaRPr lang="en-IT"/>
+            <a:endParaRPr lang="en-IT" dirty="0"/>
           </a:p>
         </p:txBody>
       </p:sp>

</xml_diff>